<commit_message>
made lesson a weak entity
</commit_message>
<xml_diff>
--- a/milestone_2_presentation.pptx
+++ b/milestone_2_presentation.pptx
@@ -206,7 +206,7 @@
           <a:p>
             <a:fld id="{5D6344E8-ED7B-4E86-98BB-D4B8630E1706}" type="datetimeFigureOut">
               <a:rPr lang="en-US" smtClean="0"/>
-              <a:t>9/26/2020</a:t>
+              <a:t>9/30/2020</a:t>
             </a:fld>
             <a:endParaRPr lang="en-US"/>
           </a:p>
@@ -709,7 +709,7 @@
           <a:p>
             <a:fld id="{AB566608-4345-4650-8781-22079023BD92}" type="datetimeFigureOut">
               <a:rPr lang="en-US" smtClean="0"/>
-              <a:t>9/26/2020</a:t>
+              <a:t>9/30/2020</a:t>
             </a:fld>
             <a:endParaRPr lang="en-US"/>
           </a:p>
@@ -907,7 +907,7 @@
           <a:p>
             <a:fld id="{AB566608-4345-4650-8781-22079023BD92}" type="datetimeFigureOut">
               <a:rPr lang="en-US" smtClean="0"/>
-              <a:t>9/26/2020</a:t>
+              <a:t>9/30/2020</a:t>
             </a:fld>
             <a:endParaRPr lang="en-US"/>
           </a:p>
@@ -1115,7 +1115,7 @@
           <a:p>
             <a:fld id="{AB566608-4345-4650-8781-22079023BD92}" type="datetimeFigureOut">
               <a:rPr lang="en-US" smtClean="0"/>
-              <a:t>9/26/2020</a:t>
+              <a:t>9/30/2020</a:t>
             </a:fld>
             <a:endParaRPr lang="en-US"/>
           </a:p>
@@ -1412,7 +1412,7 @@
           <a:p>
             <a:fld id="{AB566608-4345-4650-8781-22079023BD92}" type="datetimeFigureOut">
               <a:rPr lang="en-US" smtClean="0"/>
-              <a:t>9/26/2020</a:t>
+              <a:t>9/30/2020</a:t>
             </a:fld>
             <a:endParaRPr lang="en-US"/>
           </a:p>
@@ -1687,7 +1687,7 @@
           <a:p>
             <a:fld id="{AB566608-4345-4650-8781-22079023BD92}" type="datetimeFigureOut">
               <a:rPr lang="en-US" smtClean="0"/>
-              <a:t>9/26/2020</a:t>
+              <a:t>9/30/2020</a:t>
             </a:fld>
             <a:endParaRPr lang="en-US"/>
           </a:p>
@@ -1952,7 +1952,7 @@
           <a:p>
             <a:fld id="{AB566608-4345-4650-8781-22079023BD92}" type="datetimeFigureOut">
               <a:rPr lang="en-US" smtClean="0"/>
-              <a:t>9/26/2020</a:t>
+              <a:t>9/30/2020</a:t>
             </a:fld>
             <a:endParaRPr lang="en-US"/>
           </a:p>
@@ -2364,7 +2364,7 @@
           <a:p>
             <a:fld id="{AB566608-4345-4650-8781-22079023BD92}" type="datetimeFigureOut">
               <a:rPr lang="en-US" smtClean="0"/>
-              <a:t>9/26/2020</a:t>
+              <a:t>9/30/2020</a:t>
             </a:fld>
             <a:endParaRPr lang="en-US"/>
           </a:p>
@@ -2505,7 +2505,7 @@
           <a:p>
             <a:fld id="{AB566608-4345-4650-8781-22079023BD92}" type="datetimeFigureOut">
               <a:rPr lang="en-US" smtClean="0"/>
-              <a:t>9/26/2020</a:t>
+              <a:t>9/30/2020</a:t>
             </a:fld>
             <a:endParaRPr lang="en-US"/>
           </a:p>
@@ -2618,7 +2618,7 @@
           <a:p>
             <a:fld id="{AB566608-4345-4650-8781-22079023BD92}" type="datetimeFigureOut">
               <a:rPr lang="en-US" smtClean="0"/>
-              <a:t>9/26/2020</a:t>
+              <a:t>9/30/2020</a:t>
             </a:fld>
             <a:endParaRPr lang="en-US"/>
           </a:p>
@@ -2929,7 +2929,7 @@
           <a:p>
             <a:fld id="{AB566608-4345-4650-8781-22079023BD92}" type="datetimeFigureOut">
               <a:rPr lang="en-US" smtClean="0"/>
-              <a:t>9/26/2020</a:t>
+              <a:t>9/30/2020</a:t>
             </a:fld>
             <a:endParaRPr lang="en-US"/>
           </a:p>
@@ -3217,7 +3217,7 @@
           <a:p>
             <a:fld id="{AB566608-4345-4650-8781-22079023BD92}" type="datetimeFigureOut">
               <a:rPr lang="en-US" smtClean="0"/>
-              <a:t>9/26/2020</a:t>
+              <a:t>9/30/2020</a:t>
             </a:fld>
             <a:endParaRPr lang="en-US"/>
           </a:p>
@@ -3458,7 +3458,7 @@
           <a:p>
             <a:fld id="{AB566608-4345-4650-8781-22079023BD92}" type="datetimeFigureOut">
               <a:rPr lang="en-US" smtClean="0"/>
-              <a:t>9/26/2020</a:t>
+              <a:t>9/30/2020</a:t>
             </a:fld>
             <a:endParaRPr lang="en-US"/>
           </a:p>
@@ -5274,6 +5274,16 @@
 <file path=ppt/slides/slide4.xml><?xml version="1.0" encoding="utf-8"?>
 <p:sld xmlns:a="http://schemas.openxmlformats.org/drawingml/2006/main" xmlns:r="http://schemas.openxmlformats.org/officeDocument/2006/relationships" xmlns:p="http://schemas.openxmlformats.org/presentationml/2006/main">
   <p:cSld>
+    <p:bg>
+      <p:bgPr>
+        <a:solidFill>
+          <a:schemeClr val="bg1">
+            <a:alpha val="31000"/>
+          </a:schemeClr>
+        </a:solidFill>
+        <a:effectLst/>
+      </p:bgPr>
+    </p:bg>
     <p:spTree>
       <p:nvGrpSpPr>
         <p:cNvPr id="1" name=""/>
@@ -5381,7 +5391,7 @@
             <a:avLst/>
           </a:prstGeom>
           <a:noFill/>
-          <a:ln>
+          <a:ln w="47625">
             <a:solidFill>
               <a:schemeClr val="tx1"/>
             </a:solidFill>
@@ -5626,7 +5636,7 @@
           <a:solidFill>
             <a:schemeClr val="bg1"/>
           </a:solidFill>
-          <a:ln>
+          <a:ln w="41275">
             <a:solidFill>
               <a:schemeClr val="tx1"/>
             </a:solidFill>
@@ -6105,10 +6115,15 @@
             <a:avLst/>
           </a:prstGeom>
           <a:noFill/>
-          <a:ln>
+          <a:ln w="53975">
             <a:solidFill>
-              <a:schemeClr val="tx1"/>
+              <a:schemeClr val="tx1">
+                <a:lumMod val="50000"/>
+                <a:lumOff val="50000"/>
+                <a:alpha val="85000"/>
+              </a:schemeClr>
             </a:solidFill>
+            <a:prstDash val="sysDash"/>
           </a:ln>
         </p:spPr>
         <p:txBody>

</xml_diff>